<commit_message>
work on lesson : hanlin9 example
</commit_message>
<xml_diff>
--- a/課程資料/從Scratch到Python(9上翰林版)/說明.pptx
+++ b/課程資料/從Scratch到Python(9上翰林版)/說明.pptx
@@ -7,7 +7,7 @@
   <p:sldIdLst>
     <p:sldId id="262" r:id="rId2"/>
     <p:sldId id="264" r:id="rId3"/>
-    <p:sldId id="263" r:id="rId4"/>
+    <p:sldId id="265" r:id="rId4"/>
   </p:sldIdLst>
   <p:sldSz cx="12192000" cy="6858000"/>
   <p:notesSz cx="6858000" cy="9144000"/>
@@ -261,7 +261,7 @@
           <a:p>
             <a:fld id="{FA16A518-A0C3-4B00-9084-763C6916F68A}" type="datetimeFigureOut">
               <a:rPr lang="zh-TW" altLang="en-US" smtClean="0"/>
-              <a:t>2022/3/16</a:t>
+              <a:t>2022/3/20</a:t>
             </a:fld>
             <a:endParaRPr lang="zh-TW" altLang="en-US"/>
           </a:p>
@@ -459,7 +459,7 @@
           <a:p>
             <a:fld id="{FA16A518-A0C3-4B00-9084-763C6916F68A}" type="datetimeFigureOut">
               <a:rPr lang="zh-TW" altLang="en-US" smtClean="0"/>
-              <a:t>2022/3/16</a:t>
+              <a:t>2022/3/20</a:t>
             </a:fld>
             <a:endParaRPr lang="zh-TW" altLang="en-US"/>
           </a:p>
@@ -667,7 +667,7 @@
           <a:p>
             <a:fld id="{FA16A518-A0C3-4B00-9084-763C6916F68A}" type="datetimeFigureOut">
               <a:rPr lang="zh-TW" altLang="en-US" smtClean="0"/>
-              <a:t>2022/3/16</a:t>
+              <a:t>2022/3/20</a:t>
             </a:fld>
             <a:endParaRPr lang="zh-TW" altLang="en-US"/>
           </a:p>
@@ -865,7 +865,7 @@
           <a:p>
             <a:fld id="{FA16A518-A0C3-4B00-9084-763C6916F68A}" type="datetimeFigureOut">
               <a:rPr lang="zh-TW" altLang="en-US" smtClean="0"/>
-              <a:t>2022/3/16</a:t>
+              <a:t>2022/3/20</a:t>
             </a:fld>
             <a:endParaRPr lang="zh-TW" altLang="en-US"/>
           </a:p>
@@ -1140,7 +1140,7 @@
           <a:p>
             <a:fld id="{FA16A518-A0C3-4B00-9084-763C6916F68A}" type="datetimeFigureOut">
               <a:rPr lang="zh-TW" altLang="en-US" smtClean="0"/>
-              <a:t>2022/3/16</a:t>
+              <a:t>2022/3/20</a:t>
             </a:fld>
             <a:endParaRPr lang="zh-TW" altLang="en-US"/>
           </a:p>
@@ -1405,7 +1405,7 @@
           <a:p>
             <a:fld id="{FA16A518-A0C3-4B00-9084-763C6916F68A}" type="datetimeFigureOut">
               <a:rPr lang="zh-TW" altLang="en-US" smtClean="0"/>
-              <a:t>2022/3/16</a:t>
+              <a:t>2022/3/20</a:t>
             </a:fld>
             <a:endParaRPr lang="zh-TW" altLang="en-US"/>
           </a:p>
@@ -1817,7 +1817,7 @@
           <a:p>
             <a:fld id="{FA16A518-A0C3-4B00-9084-763C6916F68A}" type="datetimeFigureOut">
               <a:rPr lang="zh-TW" altLang="en-US" smtClean="0"/>
-              <a:t>2022/3/16</a:t>
+              <a:t>2022/3/20</a:t>
             </a:fld>
             <a:endParaRPr lang="zh-TW" altLang="en-US"/>
           </a:p>
@@ -1958,7 +1958,7 @@
           <a:p>
             <a:fld id="{FA16A518-A0C3-4B00-9084-763C6916F68A}" type="datetimeFigureOut">
               <a:rPr lang="zh-TW" altLang="en-US" smtClean="0"/>
-              <a:t>2022/3/16</a:t>
+              <a:t>2022/3/20</a:t>
             </a:fld>
             <a:endParaRPr lang="zh-TW" altLang="en-US"/>
           </a:p>
@@ -2071,7 +2071,7 @@
           <a:p>
             <a:fld id="{FA16A518-A0C3-4B00-9084-763C6916F68A}" type="datetimeFigureOut">
               <a:rPr lang="zh-TW" altLang="en-US" smtClean="0"/>
-              <a:t>2022/3/16</a:t>
+              <a:t>2022/3/20</a:t>
             </a:fld>
             <a:endParaRPr lang="zh-TW" altLang="en-US"/>
           </a:p>
@@ -2382,7 +2382,7 @@
           <a:p>
             <a:fld id="{FA16A518-A0C3-4B00-9084-763C6916F68A}" type="datetimeFigureOut">
               <a:rPr lang="zh-TW" altLang="en-US" smtClean="0"/>
-              <a:t>2022/3/16</a:t>
+              <a:t>2022/3/20</a:t>
             </a:fld>
             <a:endParaRPr lang="zh-TW" altLang="en-US"/>
           </a:p>
@@ -2670,7 +2670,7 @@
           <a:p>
             <a:fld id="{FA16A518-A0C3-4B00-9084-763C6916F68A}" type="datetimeFigureOut">
               <a:rPr lang="zh-TW" altLang="en-US" smtClean="0"/>
-              <a:t>2022/3/16</a:t>
+              <a:t>2022/3/20</a:t>
             </a:fld>
             <a:endParaRPr lang="zh-TW" altLang="en-US"/>
           </a:p>
@@ -2911,7 +2911,7 @@
           <a:p>
             <a:fld id="{FA16A518-A0C3-4B00-9084-763C6916F68A}" type="datetimeFigureOut">
               <a:rPr lang="zh-TW" altLang="en-US" smtClean="0"/>
-              <a:t>2022/3/16</a:t>
+              <a:t>2022/3/20</a:t>
             </a:fld>
             <a:endParaRPr lang="zh-TW" altLang="en-US"/>
           </a:p>
@@ -4191,10 +4191,1066 @@
           <a:chExt cx="0" cy="0"/>
         </a:xfrm>
       </p:grpSpPr>
+      <p:sp>
+        <p:nvSpPr>
+          <p:cNvPr id="22" name="文字方塊 21">
+            <a:extLst>
+              <a:ext uri="{FF2B5EF4-FFF2-40B4-BE49-F238E27FC236}">
+                <a16:creationId xmlns:a16="http://schemas.microsoft.com/office/drawing/2014/main" id="{03115229-3A5A-41F8-9D5D-5B9097ED92B8}"/>
+              </a:ext>
+            </a:extLst>
+          </p:cNvPr>
+          <p:cNvSpPr txBox="1"/>
+          <p:nvPr/>
+        </p:nvSpPr>
+        <p:spPr>
+          <a:xfrm>
+            <a:off x="4163039" y="1766197"/>
+            <a:ext cx="3110835" cy="584775"/>
+          </a:xfrm>
+          <a:prstGeom prst="rect">
+            <a:avLst/>
+          </a:prstGeom>
+          <a:noFill/>
+        </p:spPr>
+        <p:txBody>
+          <a:bodyPr wrap="square" rtlCol="0">
+            <a:spAutoFit/>
+          </a:bodyPr>
+          <a:lstStyle/>
+          <a:p>
+            <a:r>
+              <a:rPr lang="zh-TW" altLang="en-US" sz="3200" dirty="0">
+                <a:effectLst>
+                  <a:outerShdw blurRad="38100" dist="38100" dir="2700000" algn="tl">
+                    <a:srgbClr val="000000">
+                      <a:alpha val="43137"/>
+                    </a:srgbClr>
+                  </a:outerShdw>
+                </a:effectLst>
+                <a:latin typeface="微軟正黑體 Light" panose="020B0304030504040204" pitchFamily="34" charset="-120"/>
+                <a:ea typeface="微軟正黑體 Light" panose="020B0304030504040204" pitchFamily="34" charset="-120"/>
+              </a:rPr>
+              <a:t>資料型態與轉換</a:t>
+            </a:r>
+          </a:p>
+        </p:txBody>
+      </p:sp>
+      <p:pic>
+        <p:nvPicPr>
+          <p:cNvPr id="3" name="圖片 2">
+            <a:extLst>
+              <a:ext uri="{FF2B5EF4-FFF2-40B4-BE49-F238E27FC236}">
+                <a16:creationId xmlns:a16="http://schemas.microsoft.com/office/drawing/2014/main" id="{11E24AD8-DFA3-4D8F-A352-270C73149BE4}"/>
+              </a:ext>
+            </a:extLst>
+          </p:cNvPr>
+          <p:cNvPicPr>
+            <a:picLocks noChangeAspect="1"/>
+          </p:cNvPicPr>
+          <p:nvPr/>
+        </p:nvPicPr>
+        <p:blipFill>
+          <a:blip r:embed="rId2">
+            <a:extLst>
+              <a:ext uri="{28A0092B-C50C-407E-A947-70E740481C1C}">
+                <a14:useLocalDpi xmlns:a14="http://schemas.microsoft.com/office/drawing/2010/main" val="0"/>
+              </a:ext>
+            </a:extLst>
+          </a:blip>
+          <a:stretch>
+            <a:fillRect/>
+          </a:stretch>
+        </p:blipFill>
+        <p:spPr>
+          <a:xfrm>
+            <a:off x="8780392" y="2687235"/>
+            <a:ext cx="1146841" cy="1063296"/>
+          </a:xfrm>
+          <a:prstGeom prst="rect">
+            <a:avLst/>
+          </a:prstGeom>
+        </p:spPr>
+      </p:pic>
+      <p:pic>
+        <p:nvPicPr>
+          <p:cNvPr id="5" name="圖片 4">
+            <a:extLst>
+              <a:ext uri="{FF2B5EF4-FFF2-40B4-BE49-F238E27FC236}">
+                <a16:creationId xmlns:a16="http://schemas.microsoft.com/office/drawing/2014/main" id="{E3864406-CE46-49F6-B61D-6DE35A537E3B}"/>
+              </a:ext>
+            </a:extLst>
+          </p:cNvPr>
+          <p:cNvPicPr>
+            <a:picLocks noChangeAspect="1"/>
+          </p:cNvPicPr>
+          <p:nvPr/>
+        </p:nvPicPr>
+        <p:blipFill>
+          <a:blip r:embed="rId3">
+            <a:extLst>
+              <a:ext uri="{28A0092B-C50C-407E-A947-70E740481C1C}">
+                <a14:useLocalDpi xmlns:a14="http://schemas.microsoft.com/office/drawing/2010/main" val="0"/>
+              </a:ext>
+            </a:extLst>
+          </a:blip>
+          <a:stretch>
+            <a:fillRect/>
+          </a:stretch>
+        </p:blipFill>
+        <p:spPr>
+          <a:xfrm>
+            <a:off x="1267084" y="2740876"/>
+            <a:ext cx="1230662" cy="898459"/>
+          </a:xfrm>
+          <a:prstGeom prst="rect">
+            <a:avLst/>
+          </a:prstGeom>
+        </p:spPr>
+      </p:pic>
+      <p:sp>
+        <p:nvSpPr>
+          <p:cNvPr id="24" name="文字方塊 23">
+            <a:extLst>
+              <a:ext uri="{FF2B5EF4-FFF2-40B4-BE49-F238E27FC236}">
+                <a16:creationId xmlns:a16="http://schemas.microsoft.com/office/drawing/2014/main" id="{6DC44BEC-0EB6-40BC-A355-4F1DD14EF568}"/>
+              </a:ext>
+            </a:extLst>
+          </p:cNvPr>
+          <p:cNvSpPr txBox="1"/>
+          <p:nvPr/>
+        </p:nvSpPr>
+        <p:spPr>
+          <a:xfrm>
+            <a:off x="1474809" y="3628644"/>
+            <a:ext cx="885836" cy="461665"/>
+          </a:xfrm>
+          <a:prstGeom prst="rect">
+            <a:avLst/>
+          </a:prstGeom>
+          <a:noFill/>
+        </p:spPr>
+        <p:txBody>
+          <a:bodyPr wrap="square" rtlCol="0">
+            <a:spAutoFit/>
+          </a:bodyPr>
+          <a:lstStyle/>
+          <a:p>
+            <a:r>
+              <a:rPr lang="zh-TW" altLang="en-US" sz="2400" dirty="0">
+                <a:solidFill>
+                  <a:srgbClr val="0070C0"/>
+                </a:solidFill>
+                <a:latin typeface="華康中圓體" panose="020F0509000000000000" pitchFamily="49" charset="-120"/>
+                <a:ea typeface="華康中圓體" panose="020F0509000000000000" pitchFamily="49" charset="-120"/>
+              </a:rPr>
+              <a:t>輸入</a:t>
+            </a:r>
+          </a:p>
+        </p:txBody>
+      </p:sp>
+      <p:sp>
+        <p:nvSpPr>
+          <p:cNvPr id="28" name="文字方塊 27">
+            <a:extLst>
+              <a:ext uri="{FF2B5EF4-FFF2-40B4-BE49-F238E27FC236}">
+                <a16:creationId xmlns:a16="http://schemas.microsoft.com/office/drawing/2014/main" id="{183D795C-28DA-4FE8-A5AA-E5E377AA095F}"/>
+              </a:ext>
+            </a:extLst>
+          </p:cNvPr>
+          <p:cNvSpPr txBox="1"/>
+          <p:nvPr/>
+        </p:nvSpPr>
+        <p:spPr>
+          <a:xfrm>
+            <a:off x="1474809" y="4337396"/>
+            <a:ext cx="885836" cy="461665"/>
+          </a:xfrm>
+          <a:prstGeom prst="rect">
+            <a:avLst/>
+          </a:prstGeom>
+          <a:noFill/>
+        </p:spPr>
+        <p:txBody>
+          <a:bodyPr wrap="square" rtlCol="0">
+            <a:spAutoFit/>
+          </a:bodyPr>
+          <a:lstStyle/>
+          <a:p>
+            <a:r>
+              <a:rPr lang="zh-TW" altLang="en-US" sz="2400" dirty="0">
+                <a:solidFill>
+                  <a:srgbClr val="C00000"/>
+                </a:solidFill>
+                <a:latin typeface="華康中圓體" panose="020F0509000000000000" pitchFamily="49" charset="-120"/>
+                <a:ea typeface="華康中圓體" panose="020F0509000000000000" pitchFamily="49" charset="-120"/>
+              </a:rPr>
+              <a:t>字串</a:t>
+            </a:r>
+          </a:p>
+        </p:txBody>
+      </p:sp>
+      <p:grpSp>
+        <p:nvGrpSpPr>
+          <p:cNvPr id="4" name="群組 3">
+            <a:extLst>
+              <a:ext uri="{FF2B5EF4-FFF2-40B4-BE49-F238E27FC236}">
+                <a16:creationId xmlns:a16="http://schemas.microsoft.com/office/drawing/2014/main" id="{C0ED2956-0C4F-4F7C-89B0-D52145500559}"/>
+              </a:ext>
+            </a:extLst>
+          </p:cNvPr>
+          <p:cNvGrpSpPr/>
+          <p:nvPr/>
+        </p:nvGrpSpPr>
+        <p:grpSpPr>
+          <a:xfrm>
+            <a:off x="3377462" y="2782750"/>
+            <a:ext cx="829106" cy="782801"/>
+            <a:chOff x="3310814" y="4357395"/>
+            <a:chExt cx="1083904" cy="1026368"/>
+          </a:xfrm>
+        </p:grpSpPr>
+        <p:sp>
+          <p:nvSpPr>
+            <p:cNvPr id="2" name="箭號: 弧形左彎 1">
+              <a:extLst>
+                <a:ext uri="{FF2B5EF4-FFF2-40B4-BE49-F238E27FC236}">
+                  <a16:creationId xmlns:a16="http://schemas.microsoft.com/office/drawing/2014/main" id="{2151A0FB-C504-4EF7-BBEF-DECC035A853D}"/>
+                </a:ext>
+              </a:extLst>
+            </p:cNvPr>
+            <p:cNvSpPr/>
+            <p:nvPr/>
+          </p:nvSpPr>
+          <p:spPr>
+            <a:xfrm>
+              <a:off x="3909527" y="4357396"/>
+              <a:ext cx="485191" cy="1026367"/>
+            </a:xfrm>
+            <a:prstGeom prst="curvedLeftArrow">
+              <a:avLst/>
+            </a:prstGeom>
+          </p:spPr>
+          <p:style>
+            <a:lnRef idx="3">
+              <a:schemeClr val="lt1"/>
+            </a:lnRef>
+            <a:fillRef idx="1">
+              <a:schemeClr val="accent1"/>
+            </a:fillRef>
+            <a:effectRef idx="1">
+              <a:schemeClr val="accent1"/>
+            </a:effectRef>
+            <a:fontRef idx="minor">
+              <a:schemeClr val="lt1"/>
+            </a:fontRef>
+          </p:style>
+          <p:txBody>
+            <a:bodyPr rtlCol="0" anchor="ctr"/>
+            <a:lstStyle/>
+            <a:p>
+              <a:pPr algn="ctr"/>
+              <a:endParaRPr lang="zh-TW" altLang="en-US">
+                <a:solidFill>
+                  <a:schemeClr val="tx1"/>
+                </a:solidFill>
+              </a:endParaRPr>
+            </a:p>
+          </p:txBody>
+        </p:sp>
+        <p:sp>
+          <p:nvSpPr>
+            <p:cNvPr id="14" name="箭號: 弧形左彎 13">
+              <a:extLst>
+                <a:ext uri="{FF2B5EF4-FFF2-40B4-BE49-F238E27FC236}">
+                  <a16:creationId xmlns:a16="http://schemas.microsoft.com/office/drawing/2014/main" id="{3155B158-6706-4E5D-A643-BD5B7BF15EEB}"/>
+                </a:ext>
+              </a:extLst>
+            </p:cNvPr>
+            <p:cNvSpPr/>
+            <p:nvPr/>
+          </p:nvSpPr>
+          <p:spPr>
+            <a:xfrm rot="10800000">
+              <a:off x="3310814" y="4357395"/>
+              <a:ext cx="485191" cy="1026367"/>
+            </a:xfrm>
+            <a:prstGeom prst="curvedLeftArrow">
+              <a:avLst/>
+            </a:prstGeom>
+          </p:spPr>
+          <p:style>
+            <a:lnRef idx="3">
+              <a:schemeClr val="lt1"/>
+            </a:lnRef>
+            <a:fillRef idx="1">
+              <a:schemeClr val="accent1"/>
+            </a:fillRef>
+            <a:effectRef idx="1">
+              <a:schemeClr val="accent1"/>
+            </a:effectRef>
+            <a:fontRef idx="minor">
+              <a:schemeClr val="lt1"/>
+            </a:fontRef>
+          </p:style>
+          <p:txBody>
+            <a:bodyPr rtlCol="0" anchor="ctr"/>
+            <a:lstStyle/>
+            <a:p>
+              <a:pPr algn="ctr"/>
+              <a:endParaRPr lang="zh-TW" altLang="en-US">
+                <a:solidFill>
+                  <a:schemeClr val="tx1"/>
+                </a:solidFill>
+              </a:endParaRPr>
+            </a:p>
+          </p:txBody>
+        </p:sp>
+      </p:grpSp>
+      <p:sp>
+        <p:nvSpPr>
+          <p:cNvPr id="7" name="矩形 6">
+            <a:extLst>
+              <a:ext uri="{FF2B5EF4-FFF2-40B4-BE49-F238E27FC236}">
+                <a16:creationId xmlns:a16="http://schemas.microsoft.com/office/drawing/2014/main" id="{F90659D8-F6BF-483E-A373-F6880AD53626}"/>
+              </a:ext>
+            </a:extLst>
+          </p:cNvPr>
+          <p:cNvSpPr/>
+          <p:nvPr/>
+        </p:nvSpPr>
+        <p:spPr>
+          <a:xfrm>
+            <a:off x="5103129" y="2712484"/>
+            <a:ext cx="1230662" cy="923330"/>
+          </a:xfrm>
+          <a:prstGeom prst="rect">
+            <a:avLst/>
+          </a:prstGeom>
+          <a:noFill/>
+        </p:spPr>
+        <p:txBody>
+          <a:bodyPr wrap="square" lIns="91440" tIns="45720" rIns="91440" bIns="45720">
+            <a:spAutoFit/>
+          </a:bodyPr>
+          <a:lstStyle/>
+          <a:p>
+            <a:pPr algn="ctr"/>
+            <a:r>
+              <a:rPr lang="en-US" altLang="zh-TW" sz="5400" dirty="0">
+                <a:ln w="0"/>
+                <a:solidFill>
+                  <a:schemeClr val="accent1"/>
+                </a:solidFill>
+                <a:effectLst>
+                  <a:outerShdw blurRad="38100" dist="25400" dir="5400000" algn="ctr" rotWithShape="0">
+                    <a:srgbClr val="6E747A">
+                      <a:alpha val="43000"/>
+                    </a:srgbClr>
+                  </a:outerShdw>
+                </a:effectLst>
+              </a:rPr>
+              <a:t>+/-</a:t>
+            </a:r>
+          </a:p>
+        </p:txBody>
+      </p:sp>
+      <p:sp>
+        <p:nvSpPr>
+          <p:cNvPr id="15" name="箭號: 向右 14">
+            <a:extLst>
+              <a:ext uri="{FF2B5EF4-FFF2-40B4-BE49-F238E27FC236}">
+                <a16:creationId xmlns:a16="http://schemas.microsoft.com/office/drawing/2014/main" id="{3B869D63-9DA0-486C-B7F9-296F60F8F4E2}"/>
+              </a:ext>
+            </a:extLst>
+          </p:cNvPr>
+          <p:cNvSpPr/>
+          <p:nvPr/>
+        </p:nvSpPr>
+        <p:spPr>
+          <a:xfrm>
+            <a:off x="2716825" y="2994516"/>
+            <a:ext cx="371137" cy="345843"/>
+          </a:xfrm>
+          <a:prstGeom prst="rightArrow">
+            <a:avLst/>
+          </a:prstGeom>
+          <a:solidFill>
+            <a:schemeClr val="accent4">
+              <a:lumMod val="20000"/>
+              <a:lumOff val="80000"/>
+            </a:schemeClr>
+          </a:solidFill>
+        </p:spPr>
+        <p:style>
+          <a:lnRef idx="2">
+            <a:schemeClr val="accent3"/>
+          </a:lnRef>
+          <a:fillRef idx="1">
+            <a:schemeClr val="lt1"/>
+          </a:fillRef>
+          <a:effectRef idx="0">
+            <a:schemeClr val="accent3"/>
+          </a:effectRef>
+          <a:fontRef idx="minor">
+            <a:schemeClr val="dk1"/>
+          </a:fontRef>
+        </p:style>
+        <p:txBody>
+          <a:bodyPr rtlCol="0" anchor="ctr"/>
+          <a:lstStyle/>
+          <a:p>
+            <a:pPr algn="ctr"/>
+            <a:endParaRPr lang="zh-TW" altLang="en-US"/>
+          </a:p>
+        </p:txBody>
+      </p:sp>
+      <p:sp>
+        <p:nvSpPr>
+          <p:cNvPr id="34" name="箭號: 向右 33">
+            <a:extLst>
+              <a:ext uri="{FF2B5EF4-FFF2-40B4-BE49-F238E27FC236}">
+                <a16:creationId xmlns:a16="http://schemas.microsoft.com/office/drawing/2014/main" id="{9A988B56-9A3E-4ADD-B81E-07C087D3E483}"/>
+              </a:ext>
+            </a:extLst>
+          </p:cNvPr>
+          <p:cNvSpPr/>
+          <p:nvPr/>
+        </p:nvSpPr>
+        <p:spPr>
+          <a:xfrm>
+            <a:off x="4580303" y="3001228"/>
+            <a:ext cx="371137" cy="345843"/>
+          </a:xfrm>
+          <a:prstGeom prst="rightArrow">
+            <a:avLst/>
+          </a:prstGeom>
+          <a:solidFill>
+            <a:schemeClr val="accent4">
+              <a:lumMod val="20000"/>
+              <a:lumOff val="80000"/>
+            </a:schemeClr>
+          </a:solidFill>
+        </p:spPr>
+        <p:style>
+          <a:lnRef idx="2">
+            <a:schemeClr val="accent3"/>
+          </a:lnRef>
+          <a:fillRef idx="1">
+            <a:schemeClr val="lt1"/>
+          </a:fillRef>
+          <a:effectRef idx="0">
+            <a:schemeClr val="accent3"/>
+          </a:effectRef>
+          <a:fontRef idx="minor">
+            <a:schemeClr val="dk1"/>
+          </a:fontRef>
+        </p:style>
+        <p:txBody>
+          <a:bodyPr rtlCol="0" anchor="ctr"/>
+          <a:lstStyle/>
+          <a:p>
+            <a:pPr algn="ctr"/>
+            <a:endParaRPr lang="zh-TW" altLang="en-US"/>
+          </a:p>
+        </p:txBody>
+      </p:sp>
+      <p:sp>
+        <p:nvSpPr>
+          <p:cNvPr id="35" name="箭號: 向右 34">
+            <a:extLst>
+              <a:ext uri="{FF2B5EF4-FFF2-40B4-BE49-F238E27FC236}">
+                <a16:creationId xmlns:a16="http://schemas.microsoft.com/office/drawing/2014/main" id="{38F6F5C0-2B48-4CB5-A06F-55A666C356EB}"/>
+              </a:ext>
+            </a:extLst>
+          </p:cNvPr>
+          <p:cNvSpPr/>
+          <p:nvPr/>
+        </p:nvSpPr>
+        <p:spPr>
+          <a:xfrm>
+            <a:off x="6485480" y="3001228"/>
+            <a:ext cx="371137" cy="345843"/>
+          </a:xfrm>
+          <a:prstGeom prst="rightArrow">
+            <a:avLst/>
+          </a:prstGeom>
+          <a:solidFill>
+            <a:schemeClr val="accent4">
+              <a:lumMod val="20000"/>
+              <a:lumOff val="80000"/>
+            </a:schemeClr>
+          </a:solidFill>
+        </p:spPr>
+        <p:style>
+          <a:lnRef idx="2">
+            <a:schemeClr val="accent3"/>
+          </a:lnRef>
+          <a:fillRef idx="1">
+            <a:schemeClr val="lt1"/>
+          </a:fillRef>
+          <a:effectRef idx="0">
+            <a:schemeClr val="accent3"/>
+          </a:effectRef>
+          <a:fontRef idx="minor">
+            <a:schemeClr val="dk1"/>
+          </a:fontRef>
+        </p:style>
+        <p:txBody>
+          <a:bodyPr rtlCol="0" anchor="ctr"/>
+          <a:lstStyle/>
+          <a:p>
+            <a:pPr algn="ctr"/>
+            <a:endParaRPr lang="zh-TW" altLang="en-US"/>
+          </a:p>
+        </p:txBody>
+      </p:sp>
+      <p:grpSp>
+        <p:nvGrpSpPr>
+          <p:cNvPr id="36" name="群組 35">
+            <a:extLst>
+              <a:ext uri="{FF2B5EF4-FFF2-40B4-BE49-F238E27FC236}">
+                <a16:creationId xmlns:a16="http://schemas.microsoft.com/office/drawing/2014/main" id="{A95F5ABD-157F-45B4-BDA0-11D3DFB4FE7A}"/>
+              </a:ext>
+            </a:extLst>
+          </p:cNvPr>
+          <p:cNvGrpSpPr/>
+          <p:nvPr/>
+        </p:nvGrpSpPr>
+        <p:grpSpPr>
+          <a:xfrm>
+            <a:off x="7071571" y="2761736"/>
+            <a:ext cx="829106" cy="782801"/>
+            <a:chOff x="3310814" y="4357395"/>
+            <a:chExt cx="1083904" cy="1026368"/>
+          </a:xfrm>
+        </p:grpSpPr>
+        <p:sp>
+          <p:nvSpPr>
+            <p:cNvPr id="37" name="箭號: 弧形左彎 36">
+              <a:extLst>
+                <a:ext uri="{FF2B5EF4-FFF2-40B4-BE49-F238E27FC236}">
+                  <a16:creationId xmlns:a16="http://schemas.microsoft.com/office/drawing/2014/main" id="{50EF26E9-0EC9-4946-A939-E17E3CFCDE7F}"/>
+                </a:ext>
+              </a:extLst>
+            </p:cNvPr>
+            <p:cNvSpPr/>
+            <p:nvPr/>
+          </p:nvSpPr>
+          <p:spPr>
+            <a:xfrm>
+              <a:off x="3909527" y="4357396"/>
+              <a:ext cx="485191" cy="1026367"/>
+            </a:xfrm>
+            <a:prstGeom prst="curvedLeftArrow">
+              <a:avLst/>
+            </a:prstGeom>
+          </p:spPr>
+          <p:style>
+            <a:lnRef idx="3">
+              <a:schemeClr val="lt1"/>
+            </a:lnRef>
+            <a:fillRef idx="1">
+              <a:schemeClr val="accent1"/>
+            </a:fillRef>
+            <a:effectRef idx="1">
+              <a:schemeClr val="accent1"/>
+            </a:effectRef>
+            <a:fontRef idx="minor">
+              <a:schemeClr val="lt1"/>
+            </a:fontRef>
+          </p:style>
+          <p:txBody>
+            <a:bodyPr rtlCol="0" anchor="ctr"/>
+            <a:lstStyle/>
+            <a:p>
+              <a:pPr algn="ctr"/>
+              <a:endParaRPr lang="zh-TW" altLang="en-US">
+                <a:solidFill>
+                  <a:schemeClr val="tx1"/>
+                </a:solidFill>
+              </a:endParaRPr>
+            </a:p>
+          </p:txBody>
+        </p:sp>
+        <p:sp>
+          <p:nvSpPr>
+            <p:cNvPr id="38" name="箭號: 弧形左彎 37">
+              <a:extLst>
+                <a:ext uri="{FF2B5EF4-FFF2-40B4-BE49-F238E27FC236}">
+                  <a16:creationId xmlns:a16="http://schemas.microsoft.com/office/drawing/2014/main" id="{E4B017B7-7950-4787-BAA5-0B80B430C45B}"/>
+                </a:ext>
+              </a:extLst>
+            </p:cNvPr>
+            <p:cNvSpPr/>
+            <p:nvPr/>
+          </p:nvSpPr>
+          <p:spPr>
+            <a:xfrm rot="10800000">
+              <a:off x="3310814" y="4357395"/>
+              <a:ext cx="485191" cy="1026367"/>
+            </a:xfrm>
+            <a:prstGeom prst="curvedLeftArrow">
+              <a:avLst/>
+            </a:prstGeom>
+          </p:spPr>
+          <p:style>
+            <a:lnRef idx="3">
+              <a:schemeClr val="lt1"/>
+            </a:lnRef>
+            <a:fillRef idx="1">
+              <a:schemeClr val="accent1"/>
+            </a:fillRef>
+            <a:effectRef idx="1">
+              <a:schemeClr val="accent1"/>
+            </a:effectRef>
+            <a:fontRef idx="minor">
+              <a:schemeClr val="lt1"/>
+            </a:fontRef>
+          </p:style>
+          <p:txBody>
+            <a:bodyPr rtlCol="0" anchor="ctr"/>
+            <a:lstStyle/>
+            <a:p>
+              <a:pPr algn="ctr"/>
+              <a:endParaRPr lang="zh-TW" altLang="en-US">
+                <a:solidFill>
+                  <a:schemeClr val="tx1"/>
+                </a:solidFill>
+              </a:endParaRPr>
+            </a:p>
+          </p:txBody>
+        </p:sp>
+      </p:grpSp>
+      <p:sp>
+        <p:nvSpPr>
+          <p:cNvPr id="39" name="箭號: 向右 38">
+            <a:extLst>
+              <a:ext uri="{FF2B5EF4-FFF2-40B4-BE49-F238E27FC236}">
+                <a16:creationId xmlns:a16="http://schemas.microsoft.com/office/drawing/2014/main" id="{11082062-D429-4AC2-A79D-995190D0B58F}"/>
+              </a:ext>
+            </a:extLst>
+          </p:cNvPr>
+          <p:cNvSpPr/>
+          <p:nvPr/>
+        </p:nvSpPr>
+        <p:spPr>
+          <a:xfrm>
+            <a:off x="8180486" y="3001228"/>
+            <a:ext cx="371137" cy="345843"/>
+          </a:xfrm>
+          <a:prstGeom prst="rightArrow">
+            <a:avLst/>
+          </a:prstGeom>
+          <a:solidFill>
+            <a:schemeClr val="accent4">
+              <a:lumMod val="20000"/>
+              <a:lumOff val="80000"/>
+            </a:schemeClr>
+          </a:solidFill>
+        </p:spPr>
+        <p:style>
+          <a:lnRef idx="2">
+            <a:schemeClr val="accent3"/>
+          </a:lnRef>
+          <a:fillRef idx="1">
+            <a:schemeClr val="lt1"/>
+          </a:fillRef>
+          <a:effectRef idx="0">
+            <a:schemeClr val="accent3"/>
+          </a:effectRef>
+          <a:fontRef idx="minor">
+            <a:schemeClr val="dk1"/>
+          </a:fontRef>
+        </p:style>
+        <p:txBody>
+          <a:bodyPr rtlCol="0" anchor="ctr"/>
+          <a:lstStyle/>
+          <a:p>
+            <a:pPr algn="ctr"/>
+            <a:endParaRPr lang="zh-TW" altLang="en-US"/>
+          </a:p>
+        </p:txBody>
+      </p:sp>
+      <p:cxnSp>
+        <p:nvCxnSpPr>
+          <p:cNvPr id="20" name="直線單箭頭接點 19">
+            <a:extLst>
+              <a:ext uri="{FF2B5EF4-FFF2-40B4-BE49-F238E27FC236}">
+                <a16:creationId xmlns:a16="http://schemas.microsoft.com/office/drawing/2014/main" id="{E7D041A7-B31E-4593-AAF1-CA55A6A0A219}"/>
+              </a:ext>
+            </a:extLst>
+          </p:cNvPr>
+          <p:cNvCxnSpPr>
+            <a:cxnSpLocks/>
+          </p:cNvCxnSpPr>
+          <p:nvPr/>
+        </p:nvCxnSpPr>
+        <p:spPr>
+          <a:xfrm>
+            <a:off x="1412380" y="4217437"/>
+            <a:ext cx="8612155" cy="0"/>
+          </a:xfrm>
+          <a:prstGeom prst="straightConnector1">
+            <a:avLst/>
+          </a:prstGeom>
+          <a:ln w="38100">
+            <a:solidFill>
+              <a:schemeClr val="bg1">
+                <a:lumMod val="75000"/>
+              </a:schemeClr>
+            </a:solidFill>
+            <a:prstDash val="sysDot"/>
+            <a:tailEnd type="triangle"/>
+          </a:ln>
+        </p:spPr>
+        <p:style>
+          <a:lnRef idx="1">
+            <a:schemeClr val="accent1"/>
+          </a:lnRef>
+          <a:fillRef idx="0">
+            <a:schemeClr val="accent1"/>
+          </a:fillRef>
+          <a:effectRef idx="0">
+            <a:schemeClr val="accent1"/>
+          </a:effectRef>
+          <a:fontRef idx="minor">
+            <a:schemeClr val="tx1"/>
+          </a:fontRef>
+        </p:style>
+      </p:cxnSp>
+      <p:sp>
+        <p:nvSpPr>
+          <p:cNvPr id="41" name="文字方塊 40">
+            <a:extLst>
+              <a:ext uri="{FF2B5EF4-FFF2-40B4-BE49-F238E27FC236}">
+                <a16:creationId xmlns:a16="http://schemas.microsoft.com/office/drawing/2014/main" id="{C0BAE6FB-EBBC-4AE3-8777-ACA5CBB15267}"/>
+              </a:ext>
+            </a:extLst>
+          </p:cNvPr>
+          <p:cNvSpPr txBox="1"/>
+          <p:nvPr/>
+        </p:nvSpPr>
+        <p:spPr>
+          <a:xfrm>
+            <a:off x="3418192" y="3617523"/>
+            <a:ext cx="885836" cy="461665"/>
+          </a:xfrm>
+          <a:prstGeom prst="rect">
+            <a:avLst/>
+          </a:prstGeom>
+          <a:noFill/>
+        </p:spPr>
+        <p:txBody>
+          <a:bodyPr wrap="square" rtlCol="0">
+            <a:spAutoFit/>
+          </a:bodyPr>
+          <a:lstStyle/>
+          <a:p>
+            <a:r>
+              <a:rPr lang="zh-TW" altLang="en-US" sz="2400" dirty="0">
+                <a:solidFill>
+                  <a:srgbClr val="0070C0"/>
+                </a:solidFill>
+                <a:latin typeface="華康中圓體" panose="020F0509000000000000" pitchFamily="49" charset="-120"/>
+                <a:ea typeface="華康中圓體" panose="020F0509000000000000" pitchFamily="49" charset="-120"/>
+              </a:rPr>
+              <a:t>轉換</a:t>
+            </a:r>
+          </a:p>
+        </p:txBody>
+      </p:sp>
+      <p:sp>
+        <p:nvSpPr>
+          <p:cNvPr id="42" name="文字方塊 41">
+            <a:extLst>
+              <a:ext uri="{FF2B5EF4-FFF2-40B4-BE49-F238E27FC236}">
+                <a16:creationId xmlns:a16="http://schemas.microsoft.com/office/drawing/2014/main" id="{F16F0597-09A6-4DE2-80E1-5E09816AF0C8}"/>
+              </a:ext>
+            </a:extLst>
+          </p:cNvPr>
+          <p:cNvSpPr txBox="1"/>
+          <p:nvPr/>
+        </p:nvSpPr>
+        <p:spPr>
+          <a:xfrm>
+            <a:off x="5077446" y="3614009"/>
+            <a:ext cx="1408034" cy="461665"/>
+          </a:xfrm>
+          <a:prstGeom prst="rect">
+            <a:avLst/>
+          </a:prstGeom>
+          <a:noFill/>
+        </p:spPr>
+        <p:txBody>
+          <a:bodyPr wrap="square" rtlCol="0">
+            <a:spAutoFit/>
+          </a:bodyPr>
+          <a:lstStyle/>
+          <a:p>
+            <a:r>
+              <a:rPr lang="zh-TW" altLang="en-US" sz="2400" dirty="0">
+                <a:solidFill>
+                  <a:srgbClr val="0070C0"/>
+                </a:solidFill>
+                <a:latin typeface="華康中圓體" panose="020F0509000000000000" pitchFamily="49" charset="-120"/>
+                <a:ea typeface="華康中圓體" panose="020F0509000000000000" pitchFamily="49" charset="-120"/>
+              </a:rPr>
+              <a:t>計算平均</a:t>
+            </a:r>
+          </a:p>
+        </p:txBody>
+      </p:sp>
+      <p:sp>
+        <p:nvSpPr>
+          <p:cNvPr id="43" name="文字方塊 42">
+            <a:extLst>
+              <a:ext uri="{FF2B5EF4-FFF2-40B4-BE49-F238E27FC236}">
+                <a16:creationId xmlns:a16="http://schemas.microsoft.com/office/drawing/2014/main" id="{B9BC06DE-D41D-42A8-9FC5-FBF9C7CE59D2}"/>
+              </a:ext>
+            </a:extLst>
+          </p:cNvPr>
+          <p:cNvSpPr txBox="1"/>
+          <p:nvPr/>
+        </p:nvSpPr>
+        <p:spPr>
+          <a:xfrm>
+            <a:off x="6909411" y="3602367"/>
+            <a:ext cx="1408034" cy="461665"/>
+          </a:xfrm>
+          <a:prstGeom prst="rect">
+            <a:avLst/>
+          </a:prstGeom>
+          <a:noFill/>
+        </p:spPr>
+        <p:txBody>
+          <a:bodyPr wrap="square" rtlCol="0">
+            <a:spAutoFit/>
+          </a:bodyPr>
+          <a:lstStyle/>
+          <a:p>
+            <a:r>
+              <a:rPr lang="zh-TW" altLang="en-US" sz="2400" dirty="0">
+                <a:solidFill>
+                  <a:srgbClr val="0070C0"/>
+                </a:solidFill>
+                <a:latin typeface="華康中圓體" panose="020F0509000000000000" pitchFamily="49" charset="-120"/>
+                <a:ea typeface="華康中圓體" panose="020F0509000000000000" pitchFamily="49" charset="-120"/>
+              </a:rPr>
+              <a:t>轉換組合</a:t>
+            </a:r>
+          </a:p>
+        </p:txBody>
+      </p:sp>
+      <p:sp>
+        <p:nvSpPr>
+          <p:cNvPr id="44" name="文字方塊 43">
+            <a:extLst>
+              <a:ext uri="{FF2B5EF4-FFF2-40B4-BE49-F238E27FC236}">
+                <a16:creationId xmlns:a16="http://schemas.microsoft.com/office/drawing/2014/main" id="{22A71879-5E85-4032-A5D0-AD1645BC74D1}"/>
+              </a:ext>
+            </a:extLst>
+          </p:cNvPr>
+          <p:cNvSpPr txBox="1"/>
+          <p:nvPr/>
+        </p:nvSpPr>
+        <p:spPr>
+          <a:xfrm>
+            <a:off x="8990233" y="3590725"/>
+            <a:ext cx="885836" cy="461665"/>
+          </a:xfrm>
+          <a:prstGeom prst="rect">
+            <a:avLst/>
+          </a:prstGeom>
+          <a:noFill/>
+        </p:spPr>
+        <p:txBody>
+          <a:bodyPr wrap="square" rtlCol="0">
+            <a:spAutoFit/>
+          </a:bodyPr>
+          <a:lstStyle/>
+          <a:p>
+            <a:r>
+              <a:rPr lang="zh-TW" altLang="en-US" sz="2400" dirty="0">
+                <a:solidFill>
+                  <a:srgbClr val="0070C0"/>
+                </a:solidFill>
+                <a:latin typeface="華康中圓體" panose="020F0509000000000000" pitchFamily="49" charset="-120"/>
+                <a:ea typeface="華康中圓體" panose="020F0509000000000000" pitchFamily="49" charset="-120"/>
+              </a:rPr>
+              <a:t>輸出</a:t>
+            </a:r>
+          </a:p>
+        </p:txBody>
+      </p:sp>
+      <p:sp>
+        <p:nvSpPr>
+          <p:cNvPr id="45" name="文字方塊 44">
+            <a:extLst>
+              <a:ext uri="{FF2B5EF4-FFF2-40B4-BE49-F238E27FC236}">
+                <a16:creationId xmlns:a16="http://schemas.microsoft.com/office/drawing/2014/main" id="{93E6EDCF-4A8B-4137-9721-C94F6F9792E9}"/>
+              </a:ext>
+            </a:extLst>
+          </p:cNvPr>
+          <p:cNvSpPr txBox="1"/>
+          <p:nvPr/>
+        </p:nvSpPr>
+        <p:spPr>
+          <a:xfrm>
+            <a:off x="3392515" y="4333875"/>
+            <a:ext cx="885836" cy="461665"/>
+          </a:xfrm>
+          <a:prstGeom prst="rect">
+            <a:avLst/>
+          </a:prstGeom>
+          <a:noFill/>
+        </p:spPr>
+        <p:txBody>
+          <a:bodyPr wrap="square" rtlCol="0">
+            <a:spAutoFit/>
+          </a:bodyPr>
+          <a:lstStyle/>
+          <a:p>
+            <a:r>
+              <a:rPr lang="zh-TW" altLang="en-US" sz="2400" dirty="0">
+                <a:solidFill>
+                  <a:srgbClr val="C00000"/>
+                </a:solidFill>
+                <a:latin typeface="華康中圓體" panose="020F0509000000000000" pitchFamily="49" charset="-120"/>
+                <a:ea typeface="華康中圓體" panose="020F0509000000000000" pitchFamily="49" charset="-120"/>
+              </a:rPr>
+              <a:t>整數</a:t>
+            </a:r>
+          </a:p>
+        </p:txBody>
+      </p:sp>
+      <p:sp>
+        <p:nvSpPr>
+          <p:cNvPr id="46" name="文字方塊 45">
+            <a:extLst>
+              <a:ext uri="{FF2B5EF4-FFF2-40B4-BE49-F238E27FC236}">
+                <a16:creationId xmlns:a16="http://schemas.microsoft.com/office/drawing/2014/main" id="{16F4121E-30A1-4C54-8D18-B1E6D735076C}"/>
+              </a:ext>
+            </a:extLst>
+          </p:cNvPr>
+          <p:cNvSpPr txBox="1"/>
+          <p:nvPr/>
+        </p:nvSpPr>
+        <p:spPr>
+          <a:xfrm>
+            <a:off x="5158532" y="4342612"/>
+            <a:ext cx="1175259" cy="461665"/>
+          </a:xfrm>
+          <a:prstGeom prst="rect">
+            <a:avLst/>
+          </a:prstGeom>
+          <a:noFill/>
+        </p:spPr>
+        <p:txBody>
+          <a:bodyPr wrap="square" rtlCol="0">
+            <a:spAutoFit/>
+          </a:bodyPr>
+          <a:lstStyle/>
+          <a:p>
+            <a:r>
+              <a:rPr lang="zh-TW" altLang="en-US" sz="2400" dirty="0">
+                <a:solidFill>
+                  <a:srgbClr val="C00000"/>
+                </a:solidFill>
+                <a:latin typeface="華康中圓體" panose="020F0509000000000000" pitchFamily="49" charset="-120"/>
+                <a:ea typeface="華康中圓體" panose="020F0509000000000000" pitchFamily="49" charset="-120"/>
+              </a:rPr>
+              <a:t>浮點數</a:t>
+            </a:r>
+          </a:p>
+        </p:txBody>
+      </p:sp>
+      <p:sp>
+        <p:nvSpPr>
+          <p:cNvPr id="47" name="文字方塊 46">
+            <a:extLst>
+              <a:ext uri="{FF2B5EF4-FFF2-40B4-BE49-F238E27FC236}">
+                <a16:creationId xmlns:a16="http://schemas.microsoft.com/office/drawing/2014/main" id="{BDBB918C-D6C3-4D72-AF24-E556292BBD46}"/>
+              </a:ext>
+            </a:extLst>
+          </p:cNvPr>
+          <p:cNvSpPr txBox="1"/>
+          <p:nvPr/>
+        </p:nvSpPr>
+        <p:spPr>
+          <a:xfrm>
+            <a:off x="7170510" y="4333874"/>
+            <a:ext cx="885836" cy="461665"/>
+          </a:xfrm>
+          <a:prstGeom prst="rect">
+            <a:avLst/>
+          </a:prstGeom>
+          <a:noFill/>
+        </p:spPr>
+        <p:txBody>
+          <a:bodyPr wrap="square" rtlCol="0">
+            <a:spAutoFit/>
+          </a:bodyPr>
+          <a:lstStyle/>
+          <a:p>
+            <a:r>
+              <a:rPr lang="zh-TW" altLang="en-US" sz="2400" dirty="0">
+                <a:solidFill>
+                  <a:srgbClr val="C00000"/>
+                </a:solidFill>
+                <a:latin typeface="華康中圓體" panose="020F0509000000000000" pitchFamily="49" charset="-120"/>
+                <a:ea typeface="華康中圓體" panose="020F0509000000000000" pitchFamily="49" charset="-120"/>
+              </a:rPr>
+              <a:t>字串</a:t>
+            </a:r>
+          </a:p>
+        </p:txBody>
+      </p:sp>
+      <p:sp>
+        <p:nvSpPr>
+          <p:cNvPr id="48" name="文字方塊 47">
+            <a:extLst>
+              <a:ext uri="{FF2B5EF4-FFF2-40B4-BE49-F238E27FC236}">
+                <a16:creationId xmlns:a16="http://schemas.microsoft.com/office/drawing/2014/main" id="{599A2522-63FD-419D-B23A-7C3454D98893}"/>
+              </a:ext>
+            </a:extLst>
+          </p:cNvPr>
+          <p:cNvSpPr txBox="1"/>
+          <p:nvPr/>
+        </p:nvSpPr>
+        <p:spPr>
+          <a:xfrm>
+            <a:off x="8990233" y="4314250"/>
+            <a:ext cx="885836" cy="461665"/>
+          </a:xfrm>
+          <a:prstGeom prst="rect">
+            <a:avLst/>
+          </a:prstGeom>
+          <a:noFill/>
+        </p:spPr>
+        <p:txBody>
+          <a:bodyPr wrap="square" rtlCol="0">
+            <a:spAutoFit/>
+          </a:bodyPr>
+          <a:lstStyle/>
+          <a:p>
+            <a:r>
+              <a:rPr lang="zh-TW" altLang="en-US" sz="2400" dirty="0">
+                <a:solidFill>
+                  <a:srgbClr val="C00000"/>
+                </a:solidFill>
+                <a:latin typeface="華康中圓體" panose="020F0509000000000000" pitchFamily="49" charset="-120"/>
+                <a:ea typeface="華康中圓體" panose="020F0509000000000000" pitchFamily="49" charset="-120"/>
+              </a:rPr>
+              <a:t>字串</a:t>
+            </a:r>
+          </a:p>
+        </p:txBody>
+      </p:sp>
     </p:spTree>
     <p:extLst>
       <p:ext uri="{BB962C8B-B14F-4D97-AF65-F5344CB8AC3E}">
-        <p14:creationId xmlns:p14="http://schemas.microsoft.com/office/powerpoint/2010/main" val="3041351376"/>
+        <p14:creationId xmlns:p14="http://schemas.microsoft.com/office/powerpoint/2010/main" val="3351855135"/>
       </p:ext>
     </p:extLst>
   </p:cSld>

</xml_diff>

<commit_message>
work on lesson hanlin9 example :  youtube video done
</commit_message>
<xml_diff>
--- a/課程資料/從Scratch到Python(9上翰林版)/說明.pptx
+++ b/課程資料/從Scratch到Python(9上翰林版)/說明.pptx
@@ -8,6 +8,7 @@
     <p:sldId id="262" r:id="rId2"/>
     <p:sldId id="264" r:id="rId3"/>
     <p:sldId id="265" r:id="rId4"/>
+    <p:sldId id="266" r:id="rId5"/>
   </p:sldIdLst>
   <p:sldSz cx="12192000" cy="6858000"/>
   <p:notesSz cx="6858000" cy="9144000"/>
@@ -261,7 +262,7 @@
           <a:p>
             <a:fld id="{FA16A518-A0C3-4B00-9084-763C6916F68A}" type="datetimeFigureOut">
               <a:rPr lang="zh-TW" altLang="en-US" smtClean="0"/>
-              <a:t>2022/3/20</a:t>
+              <a:t>2022/3/21</a:t>
             </a:fld>
             <a:endParaRPr lang="zh-TW" altLang="en-US"/>
           </a:p>
@@ -459,7 +460,7 @@
           <a:p>
             <a:fld id="{FA16A518-A0C3-4B00-9084-763C6916F68A}" type="datetimeFigureOut">
               <a:rPr lang="zh-TW" altLang="en-US" smtClean="0"/>
-              <a:t>2022/3/20</a:t>
+              <a:t>2022/3/21</a:t>
             </a:fld>
             <a:endParaRPr lang="zh-TW" altLang="en-US"/>
           </a:p>
@@ -667,7 +668,7 @@
           <a:p>
             <a:fld id="{FA16A518-A0C3-4B00-9084-763C6916F68A}" type="datetimeFigureOut">
               <a:rPr lang="zh-TW" altLang="en-US" smtClean="0"/>
-              <a:t>2022/3/20</a:t>
+              <a:t>2022/3/21</a:t>
             </a:fld>
             <a:endParaRPr lang="zh-TW" altLang="en-US"/>
           </a:p>
@@ -865,7 +866,7 @@
           <a:p>
             <a:fld id="{FA16A518-A0C3-4B00-9084-763C6916F68A}" type="datetimeFigureOut">
               <a:rPr lang="zh-TW" altLang="en-US" smtClean="0"/>
-              <a:t>2022/3/20</a:t>
+              <a:t>2022/3/21</a:t>
             </a:fld>
             <a:endParaRPr lang="zh-TW" altLang="en-US"/>
           </a:p>
@@ -1140,7 +1141,7 @@
           <a:p>
             <a:fld id="{FA16A518-A0C3-4B00-9084-763C6916F68A}" type="datetimeFigureOut">
               <a:rPr lang="zh-TW" altLang="en-US" smtClean="0"/>
-              <a:t>2022/3/20</a:t>
+              <a:t>2022/3/21</a:t>
             </a:fld>
             <a:endParaRPr lang="zh-TW" altLang="en-US"/>
           </a:p>
@@ -1405,7 +1406,7 @@
           <a:p>
             <a:fld id="{FA16A518-A0C3-4B00-9084-763C6916F68A}" type="datetimeFigureOut">
               <a:rPr lang="zh-TW" altLang="en-US" smtClean="0"/>
-              <a:t>2022/3/20</a:t>
+              <a:t>2022/3/21</a:t>
             </a:fld>
             <a:endParaRPr lang="zh-TW" altLang="en-US"/>
           </a:p>
@@ -1817,7 +1818,7 @@
           <a:p>
             <a:fld id="{FA16A518-A0C3-4B00-9084-763C6916F68A}" type="datetimeFigureOut">
               <a:rPr lang="zh-TW" altLang="en-US" smtClean="0"/>
-              <a:t>2022/3/20</a:t>
+              <a:t>2022/3/21</a:t>
             </a:fld>
             <a:endParaRPr lang="zh-TW" altLang="en-US"/>
           </a:p>
@@ -1958,7 +1959,7 @@
           <a:p>
             <a:fld id="{FA16A518-A0C3-4B00-9084-763C6916F68A}" type="datetimeFigureOut">
               <a:rPr lang="zh-TW" altLang="en-US" smtClean="0"/>
-              <a:t>2022/3/20</a:t>
+              <a:t>2022/3/21</a:t>
             </a:fld>
             <a:endParaRPr lang="zh-TW" altLang="en-US"/>
           </a:p>
@@ -2071,7 +2072,7 @@
           <a:p>
             <a:fld id="{FA16A518-A0C3-4B00-9084-763C6916F68A}" type="datetimeFigureOut">
               <a:rPr lang="zh-TW" altLang="en-US" smtClean="0"/>
-              <a:t>2022/3/20</a:t>
+              <a:t>2022/3/21</a:t>
             </a:fld>
             <a:endParaRPr lang="zh-TW" altLang="en-US"/>
           </a:p>
@@ -2382,7 +2383,7 @@
           <a:p>
             <a:fld id="{FA16A518-A0C3-4B00-9084-763C6916F68A}" type="datetimeFigureOut">
               <a:rPr lang="zh-TW" altLang="en-US" smtClean="0"/>
-              <a:t>2022/3/20</a:t>
+              <a:t>2022/3/21</a:t>
             </a:fld>
             <a:endParaRPr lang="zh-TW" altLang="en-US"/>
           </a:p>
@@ -2670,7 +2671,7 @@
           <a:p>
             <a:fld id="{FA16A518-A0C3-4B00-9084-763C6916F68A}" type="datetimeFigureOut">
               <a:rPr lang="zh-TW" altLang="en-US" smtClean="0"/>
-              <a:t>2022/3/20</a:t>
+              <a:t>2022/3/21</a:t>
             </a:fld>
             <a:endParaRPr lang="zh-TW" altLang="en-US"/>
           </a:p>
@@ -2911,7 +2912,7 @@
           <a:p>
             <a:fld id="{FA16A518-A0C3-4B00-9084-763C6916F68A}" type="datetimeFigureOut">
               <a:rPr lang="zh-TW" altLang="en-US" smtClean="0"/>
-              <a:t>2022/3/20</a:t>
+              <a:t>2022/3/21</a:t>
             </a:fld>
             <a:endParaRPr lang="zh-TW" altLang="en-US"/>
           </a:p>
@@ -5260,6 +5261,641 @@
 </p:sld>
 </file>
 
+<file path=ppt/slides/slide4.xml><?xml version="1.0" encoding="utf-8"?>
+<p:sld xmlns:a="http://schemas.openxmlformats.org/drawingml/2006/main" xmlns:r="http://schemas.openxmlformats.org/officeDocument/2006/relationships" xmlns:p="http://schemas.openxmlformats.org/presentationml/2006/main">
+  <p:cSld>
+    <p:spTree>
+      <p:nvGrpSpPr>
+        <p:cNvPr id="1" name=""/>
+        <p:cNvGrpSpPr/>
+        <p:nvPr/>
+      </p:nvGrpSpPr>
+      <p:grpSpPr>
+        <a:xfrm>
+          <a:off x="0" y="0"/>
+          <a:ext cx="0" cy="0"/>
+          <a:chOff x="0" y="0"/>
+          <a:chExt cx="0" cy="0"/>
+        </a:xfrm>
+      </p:grpSpPr>
+      <p:sp>
+        <p:nvSpPr>
+          <p:cNvPr id="22" name="文字方塊 21">
+            <a:extLst>
+              <a:ext uri="{FF2B5EF4-FFF2-40B4-BE49-F238E27FC236}">
+                <a16:creationId xmlns:a16="http://schemas.microsoft.com/office/drawing/2014/main" id="{03115229-3A5A-41F8-9D5D-5B9097ED92B8}"/>
+              </a:ext>
+            </a:extLst>
+          </p:cNvPr>
+          <p:cNvSpPr txBox="1"/>
+          <p:nvPr/>
+        </p:nvSpPr>
+        <p:spPr>
+          <a:xfrm>
+            <a:off x="5784262" y="1747451"/>
+            <a:ext cx="3110835" cy="584775"/>
+          </a:xfrm>
+          <a:prstGeom prst="rect">
+            <a:avLst/>
+          </a:prstGeom>
+          <a:noFill/>
+        </p:spPr>
+        <p:txBody>
+          <a:bodyPr wrap="square" rtlCol="0">
+            <a:spAutoFit/>
+          </a:bodyPr>
+          <a:lstStyle/>
+          <a:p>
+            <a:r>
+              <a:rPr lang="zh-TW" altLang="en-US" sz="3200" dirty="0">
+                <a:effectLst>
+                  <a:outerShdw blurRad="38100" dist="38100" dir="2700000" algn="tl">
+                    <a:srgbClr val="000000">
+                      <a:alpha val="43137"/>
+                    </a:srgbClr>
+                  </a:outerShdw>
+                </a:effectLst>
+                <a:latin typeface="微軟正黑體 Light" panose="020B0304030504040204" pitchFamily="34" charset="-120"/>
+                <a:ea typeface="微軟正黑體 Light" panose="020B0304030504040204" pitchFamily="34" charset="-120"/>
+              </a:rPr>
+              <a:t>資料計算與分析</a:t>
+            </a:r>
+          </a:p>
+        </p:txBody>
+      </p:sp>
+      <p:pic>
+        <p:nvPicPr>
+          <p:cNvPr id="3" name="圖片 2">
+            <a:extLst>
+              <a:ext uri="{FF2B5EF4-FFF2-40B4-BE49-F238E27FC236}">
+                <a16:creationId xmlns:a16="http://schemas.microsoft.com/office/drawing/2014/main" id="{11E24AD8-DFA3-4D8F-A352-270C73149BE4}"/>
+              </a:ext>
+            </a:extLst>
+          </p:cNvPr>
+          <p:cNvPicPr>
+            <a:picLocks noChangeAspect="1"/>
+          </p:cNvPicPr>
+          <p:nvPr/>
+        </p:nvPicPr>
+        <p:blipFill>
+          <a:blip r:embed="rId2">
+            <a:extLst>
+              <a:ext uri="{28A0092B-C50C-407E-A947-70E740481C1C}">
+                <a14:useLocalDpi xmlns:a14="http://schemas.microsoft.com/office/drawing/2010/main" val="0"/>
+              </a:ext>
+            </a:extLst>
+          </a:blip>
+          <a:stretch>
+            <a:fillRect/>
+          </a:stretch>
+        </p:blipFill>
+        <p:spPr>
+          <a:xfrm>
+            <a:off x="7660718" y="3872223"/>
+            <a:ext cx="1146841" cy="1063296"/>
+          </a:xfrm>
+          <a:prstGeom prst="rect">
+            <a:avLst/>
+          </a:prstGeom>
+        </p:spPr>
+      </p:pic>
+      <p:pic>
+        <p:nvPicPr>
+          <p:cNvPr id="5" name="圖片 4">
+            <a:extLst>
+              <a:ext uri="{FF2B5EF4-FFF2-40B4-BE49-F238E27FC236}">
+                <a16:creationId xmlns:a16="http://schemas.microsoft.com/office/drawing/2014/main" id="{E3864406-CE46-49F6-B61D-6DE35A537E3B}"/>
+              </a:ext>
+            </a:extLst>
+          </p:cNvPr>
+          <p:cNvPicPr>
+            <a:picLocks noChangeAspect="1"/>
+          </p:cNvPicPr>
+          <p:nvPr/>
+        </p:nvPicPr>
+        <p:blipFill>
+          <a:blip r:embed="rId3">
+            <a:extLst>
+              <a:ext uri="{28A0092B-C50C-407E-A947-70E740481C1C}">
+                <a14:useLocalDpi xmlns:a14="http://schemas.microsoft.com/office/drawing/2010/main" val="0"/>
+              </a:ext>
+            </a:extLst>
+          </a:blip>
+          <a:stretch>
+            <a:fillRect/>
+          </a:stretch>
+        </p:blipFill>
+        <p:spPr>
+          <a:xfrm>
+            <a:off x="1352428" y="2116502"/>
+            <a:ext cx="1230662" cy="898459"/>
+          </a:xfrm>
+          <a:prstGeom prst="rect">
+            <a:avLst/>
+          </a:prstGeom>
+        </p:spPr>
+      </p:pic>
+      <p:sp>
+        <p:nvSpPr>
+          <p:cNvPr id="24" name="文字方塊 23">
+            <a:extLst>
+              <a:ext uri="{FF2B5EF4-FFF2-40B4-BE49-F238E27FC236}">
+                <a16:creationId xmlns:a16="http://schemas.microsoft.com/office/drawing/2014/main" id="{6DC44BEC-0EB6-40BC-A355-4F1DD14EF568}"/>
+              </a:ext>
+            </a:extLst>
+          </p:cNvPr>
+          <p:cNvSpPr txBox="1"/>
+          <p:nvPr/>
+        </p:nvSpPr>
+        <p:spPr>
+          <a:xfrm>
+            <a:off x="1560153" y="3004270"/>
+            <a:ext cx="885836" cy="461665"/>
+          </a:xfrm>
+          <a:prstGeom prst="rect">
+            <a:avLst/>
+          </a:prstGeom>
+          <a:noFill/>
+        </p:spPr>
+        <p:txBody>
+          <a:bodyPr wrap="square" rtlCol="0">
+            <a:spAutoFit/>
+          </a:bodyPr>
+          <a:lstStyle/>
+          <a:p>
+            <a:r>
+              <a:rPr lang="zh-TW" altLang="en-US" sz="2400" dirty="0">
+                <a:solidFill>
+                  <a:srgbClr val="FF0000"/>
+                </a:solidFill>
+                <a:latin typeface="華康中圓體" panose="020F0509000000000000" pitchFamily="49" charset="-120"/>
+                <a:ea typeface="華康中圓體" panose="020F0509000000000000" pitchFamily="49" charset="-120"/>
+              </a:rPr>
+              <a:t>輸入</a:t>
+            </a:r>
+          </a:p>
+        </p:txBody>
+      </p:sp>
+      <p:sp>
+        <p:nvSpPr>
+          <p:cNvPr id="7" name="矩形 6">
+            <a:extLst>
+              <a:ext uri="{FF2B5EF4-FFF2-40B4-BE49-F238E27FC236}">
+                <a16:creationId xmlns:a16="http://schemas.microsoft.com/office/drawing/2014/main" id="{F90659D8-F6BF-483E-A373-F6880AD53626}"/>
+              </a:ext>
+            </a:extLst>
+          </p:cNvPr>
+          <p:cNvSpPr/>
+          <p:nvPr/>
+        </p:nvSpPr>
+        <p:spPr>
+          <a:xfrm>
+            <a:off x="3371771" y="2363508"/>
+            <a:ext cx="1230662" cy="923330"/>
+          </a:xfrm>
+          <a:prstGeom prst="rect">
+            <a:avLst/>
+          </a:prstGeom>
+          <a:noFill/>
+        </p:spPr>
+        <p:txBody>
+          <a:bodyPr wrap="square" lIns="91440" tIns="45720" rIns="91440" bIns="45720">
+            <a:spAutoFit/>
+          </a:bodyPr>
+          <a:lstStyle/>
+          <a:p>
+            <a:pPr algn="ctr"/>
+            <a:r>
+              <a:rPr lang="en-US" altLang="zh-TW" sz="5400" dirty="0">
+                <a:ln w="0"/>
+                <a:solidFill>
+                  <a:schemeClr val="accent1"/>
+                </a:solidFill>
+                <a:effectLst>
+                  <a:outerShdw blurRad="38100" dist="25400" dir="5400000" algn="ctr" rotWithShape="0">
+                    <a:srgbClr val="6E747A">
+                      <a:alpha val="43000"/>
+                    </a:srgbClr>
+                  </a:outerShdw>
+                </a:effectLst>
+              </a:rPr>
+              <a:t>+−</a:t>
+            </a:r>
+          </a:p>
+        </p:txBody>
+      </p:sp>
+      <p:sp>
+        <p:nvSpPr>
+          <p:cNvPr id="42" name="文字方塊 41">
+            <a:extLst>
+              <a:ext uri="{FF2B5EF4-FFF2-40B4-BE49-F238E27FC236}">
+                <a16:creationId xmlns:a16="http://schemas.microsoft.com/office/drawing/2014/main" id="{F16F0597-09A6-4DE2-80E1-5E09816AF0C8}"/>
+              </a:ext>
+            </a:extLst>
+          </p:cNvPr>
+          <p:cNvSpPr txBox="1"/>
+          <p:nvPr/>
+        </p:nvSpPr>
+        <p:spPr>
+          <a:xfrm>
+            <a:off x="3586904" y="3512367"/>
+            <a:ext cx="1408034" cy="461665"/>
+          </a:xfrm>
+          <a:prstGeom prst="rect">
+            <a:avLst/>
+          </a:prstGeom>
+          <a:noFill/>
+        </p:spPr>
+        <p:txBody>
+          <a:bodyPr wrap="square" rtlCol="0">
+            <a:spAutoFit/>
+          </a:bodyPr>
+          <a:lstStyle/>
+          <a:p>
+            <a:r>
+              <a:rPr lang="zh-TW" altLang="en-US" sz="2400" dirty="0">
+                <a:solidFill>
+                  <a:schemeClr val="accent2">
+                    <a:lumMod val="75000"/>
+                  </a:schemeClr>
+                </a:solidFill>
+                <a:latin typeface="華康中圓體" panose="020F0509000000000000" pitchFamily="49" charset="-120"/>
+                <a:ea typeface="華康中圓體" panose="020F0509000000000000" pitchFamily="49" charset="-120"/>
+              </a:rPr>
+              <a:t>計算</a:t>
+            </a:r>
+          </a:p>
+        </p:txBody>
+      </p:sp>
+      <p:sp>
+        <p:nvSpPr>
+          <p:cNvPr id="44" name="文字方塊 43">
+            <a:extLst>
+              <a:ext uri="{FF2B5EF4-FFF2-40B4-BE49-F238E27FC236}">
+                <a16:creationId xmlns:a16="http://schemas.microsoft.com/office/drawing/2014/main" id="{22A71879-5E85-4032-A5D0-AD1645BC74D1}"/>
+              </a:ext>
+            </a:extLst>
+          </p:cNvPr>
+          <p:cNvSpPr txBox="1"/>
+          <p:nvPr/>
+        </p:nvSpPr>
+        <p:spPr>
+          <a:xfrm>
+            <a:off x="7870559" y="4775713"/>
+            <a:ext cx="885836" cy="461665"/>
+          </a:xfrm>
+          <a:prstGeom prst="rect">
+            <a:avLst/>
+          </a:prstGeom>
+          <a:noFill/>
+        </p:spPr>
+        <p:txBody>
+          <a:bodyPr wrap="square" rtlCol="0">
+            <a:spAutoFit/>
+          </a:bodyPr>
+          <a:lstStyle/>
+          <a:p>
+            <a:r>
+              <a:rPr lang="zh-TW" altLang="en-US" sz="2400" dirty="0">
+                <a:solidFill>
+                  <a:srgbClr val="0070C0"/>
+                </a:solidFill>
+                <a:latin typeface="華康中圓體" panose="020F0509000000000000" pitchFamily="49" charset="-120"/>
+                <a:ea typeface="華康中圓體" panose="020F0509000000000000" pitchFamily="49" charset="-120"/>
+              </a:rPr>
+              <a:t>輸出</a:t>
+            </a:r>
+          </a:p>
+        </p:txBody>
+      </p:sp>
+      <p:sp>
+        <p:nvSpPr>
+          <p:cNvPr id="27" name="矩形 26">
+            <a:extLst>
+              <a:ext uri="{FF2B5EF4-FFF2-40B4-BE49-F238E27FC236}">
+                <a16:creationId xmlns:a16="http://schemas.microsoft.com/office/drawing/2014/main" id="{033B579A-E8CE-4598-AA7E-310650DA1D2E}"/>
+              </a:ext>
+            </a:extLst>
+          </p:cNvPr>
+          <p:cNvSpPr/>
+          <p:nvPr/>
+        </p:nvSpPr>
+        <p:spPr>
+          <a:xfrm>
+            <a:off x="3397353" y="2728001"/>
+            <a:ext cx="1230662" cy="923330"/>
+          </a:xfrm>
+          <a:prstGeom prst="rect">
+            <a:avLst/>
+          </a:prstGeom>
+          <a:noFill/>
+        </p:spPr>
+        <p:txBody>
+          <a:bodyPr wrap="square" lIns="91440" tIns="45720" rIns="91440" bIns="45720">
+            <a:spAutoFit/>
+          </a:bodyPr>
+          <a:lstStyle/>
+          <a:p>
+            <a:pPr algn="ctr"/>
+            <a:r>
+              <a:rPr lang="en-US" altLang="zh-TW" sz="5400" dirty="0">
+                <a:ln w="0"/>
+                <a:solidFill>
+                  <a:schemeClr val="accent1"/>
+                </a:solidFill>
+                <a:effectLst>
+                  <a:outerShdw blurRad="38100" dist="25400" dir="5400000" algn="ctr" rotWithShape="0">
+                    <a:srgbClr val="6E747A">
+                      <a:alpha val="43000"/>
+                    </a:srgbClr>
+                  </a:outerShdw>
+                </a:effectLst>
+              </a:rPr>
+              <a:t>x÷</a:t>
+            </a:r>
+          </a:p>
+        </p:txBody>
+      </p:sp>
+      <p:pic>
+        <p:nvPicPr>
+          <p:cNvPr id="9" name="圖片 8">
+            <a:extLst>
+              <a:ext uri="{FF2B5EF4-FFF2-40B4-BE49-F238E27FC236}">
+                <a16:creationId xmlns:a16="http://schemas.microsoft.com/office/drawing/2014/main" id="{E7427F09-3E9A-4290-A232-719B993468E0}"/>
+              </a:ext>
+            </a:extLst>
+          </p:cNvPr>
+          <p:cNvPicPr>
+            <a:picLocks noChangeAspect="1"/>
+          </p:cNvPicPr>
+          <p:nvPr/>
+        </p:nvPicPr>
+        <p:blipFill>
+          <a:blip r:embed="rId4">
+            <a:extLst>
+              <a:ext uri="{28A0092B-C50C-407E-A947-70E740481C1C}">
+                <a14:useLocalDpi xmlns:a14="http://schemas.microsoft.com/office/drawing/2010/main" val="0"/>
+              </a:ext>
+            </a:extLst>
+          </a:blip>
+          <a:stretch>
+            <a:fillRect/>
+          </a:stretch>
+        </p:blipFill>
+        <p:spPr>
+          <a:xfrm>
+            <a:off x="5413081" y="3429000"/>
+            <a:ext cx="1066550" cy="880050"/>
+          </a:xfrm>
+          <a:prstGeom prst="rect">
+            <a:avLst/>
+          </a:prstGeom>
+        </p:spPr>
+      </p:pic>
+      <p:cxnSp>
+        <p:nvCxnSpPr>
+          <p:cNvPr id="31" name="接點: 肘形 30">
+            <a:extLst>
+              <a:ext uri="{FF2B5EF4-FFF2-40B4-BE49-F238E27FC236}">
+                <a16:creationId xmlns:a16="http://schemas.microsoft.com/office/drawing/2014/main" id="{54DEBBF0-EFD0-4757-A6B0-5775426F6854}"/>
+              </a:ext>
+            </a:extLst>
+          </p:cNvPr>
+          <p:cNvCxnSpPr>
+            <a:cxnSpLocks/>
+          </p:cNvCxnSpPr>
+          <p:nvPr/>
+        </p:nvCxnSpPr>
+        <p:spPr>
+          <a:xfrm>
+            <a:off x="2645912" y="2654937"/>
+            <a:ext cx="798192" cy="498241"/>
+          </a:xfrm>
+          <a:prstGeom prst="bentConnector3">
+            <a:avLst>
+              <a:gd name="adj1" fmla="val 50000"/>
+            </a:avLst>
+          </a:prstGeom>
+          <a:ln w="28575">
+            <a:prstDash val="sysDot"/>
+            <a:tailEnd type="triangle"/>
+          </a:ln>
+        </p:spPr>
+        <p:style>
+          <a:lnRef idx="1">
+            <a:schemeClr val="accent1"/>
+          </a:lnRef>
+          <a:fillRef idx="0">
+            <a:schemeClr val="accent1"/>
+          </a:fillRef>
+          <a:effectRef idx="0">
+            <a:schemeClr val="accent1"/>
+          </a:effectRef>
+          <a:fontRef idx="minor">
+            <a:schemeClr val="tx1"/>
+          </a:fontRef>
+        </p:style>
+      </p:cxnSp>
+      <p:cxnSp>
+        <p:nvCxnSpPr>
+          <p:cNvPr id="33" name="接點: 肘形 32">
+            <a:extLst>
+              <a:ext uri="{FF2B5EF4-FFF2-40B4-BE49-F238E27FC236}">
+                <a16:creationId xmlns:a16="http://schemas.microsoft.com/office/drawing/2014/main" id="{A341E8AF-57ED-478A-B8B2-63F9BC38A82E}"/>
+              </a:ext>
+            </a:extLst>
+          </p:cNvPr>
+          <p:cNvCxnSpPr>
+            <a:cxnSpLocks/>
+          </p:cNvCxnSpPr>
+          <p:nvPr/>
+        </p:nvCxnSpPr>
+        <p:spPr>
+          <a:xfrm>
+            <a:off x="4466953" y="3147417"/>
+            <a:ext cx="850857" cy="563166"/>
+          </a:xfrm>
+          <a:prstGeom prst="bentConnector3">
+            <a:avLst>
+              <a:gd name="adj1" fmla="val 50000"/>
+            </a:avLst>
+          </a:prstGeom>
+          <a:ln w="28575">
+            <a:prstDash val="sysDot"/>
+            <a:tailEnd type="triangle"/>
+          </a:ln>
+        </p:spPr>
+        <p:style>
+          <a:lnRef idx="1">
+            <a:schemeClr val="accent1"/>
+          </a:lnRef>
+          <a:fillRef idx="0">
+            <a:schemeClr val="accent1"/>
+          </a:fillRef>
+          <a:effectRef idx="0">
+            <a:schemeClr val="accent1"/>
+          </a:effectRef>
+          <a:fontRef idx="minor">
+            <a:schemeClr val="tx1"/>
+          </a:fontRef>
+        </p:style>
+      </p:cxnSp>
+      <p:sp>
+        <p:nvSpPr>
+          <p:cNvPr id="40" name="文字方塊 39">
+            <a:extLst>
+              <a:ext uri="{FF2B5EF4-FFF2-40B4-BE49-F238E27FC236}">
+                <a16:creationId xmlns:a16="http://schemas.microsoft.com/office/drawing/2014/main" id="{C7A89090-CFE8-4EB2-9F1E-74D9DDAF7AB8}"/>
+              </a:ext>
+            </a:extLst>
+          </p:cNvPr>
+          <p:cNvSpPr txBox="1"/>
+          <p:nvPr/>
+        </p:nvSpPr>
+        <p:spPr>
+          <a:xfrm>
+            <a:off x="5564793" y="4309050"/>
+            <a:ext cx="1408034" cy="461665"/>
+          </a:xfrm>
+          <a:prstGeom prst="rect">
+            <a:avLst/>
+          </a:prstGeom>
+          <a:noFill/>
+        </p:spPr>
+        <p:txBody>
+          <a:bodyPr wrap="square" rtlCol="0">
+            <a:spAutoFit/>
+          </a:bodyPr>
+          <a:lstStyle/>
+          <a:p>
+            <a:r>
+              <a:rPr lang="zh-TW" altLang="en-US" sz="2400" dirty="0">
+                <a:solidFill>
+                  <a:schemeClr val="accent6">
+                    <a:lumMod val="75000"/>
+                  </a:schemeClr>
+                </a:solidFill>
+                <a:latin typeface="華康中圓體" panose="020F0509000000000000" pitchFamily="49" charset="-120"/>
+                <a:ea typeface="華康中圓體" panose="020F0509000000000000" pitchFamily="49" charset="-120"/>
+              </a:rPr>
+              <a:t>分析</a:t>
+            </a:r>
+          </a:p>
+        </p:txBody>
+      </p:sp>
+      <p:cxnSp>
+        <p:nvCxnSpPr>
+          <p:cNvPr id="49" name="接點: 肘形 48">
+            <a:extLst>
+              <a:ext uri="{FF2B5EF4-FFF2-40B4-BE49-F238E27FC236}">
+                <a16:creationId xmlns:a16="http://schemas.microsoft.com/office/drawing/2014/main" id="{D5DE0198-537A-4C49-A404-DB96C8EC2B33}"/>
+              </a:ext>
+            </a:extLst>
+          </p:cNvPr>
+          <p:cNvCxnSpPr>
+            <a:cxnSpLocks/>
+          </p:cNvCxnSpPr>
+          <p:nvPr/>
+        </p:nvCxnSpPr>
+        <p:spPr>
+          <a:xfrm>
+            <a:off x="6610494" y="3757186"/>
+            <a:ext cx="850857" cy="563166"/>
+          </a:xfrm>
+          <a:prstGeom prst="bentConnector3">
+            <a:avLst>
+              <a:gd name="adj1" fmla="val 50000"/>
+            </a:avLst>
+          </a:prstGeom>
+          <a:ln w="28575">
+            <a:prstDash val="sysDot"/>
+            <a:tailEnd type="triangle"/>
+          </a:ln>
+        </p:spPr>
+        <p:style>
+          <a:lnRef idx="1">
+            <a:schemeClr val="accent1"/>
+          </a:lnRef>
+          <a:fillRef idx="0">
+            <a:schemeClr val="accent1"/>
+          </a:fillRef>
+          <a:effectRef idx="0">
+            <a:schemeClr val="accent1"/>
+          </a:effectRef>
+          <a:fontRef idx="minor">
+            <a:schemeClr val="tx1"/>
+          </a:fontRef>
+        </p:style>
+      </p:cxnSp>
+      <p:sp>
+        <p:nvSpPr>
+          <p:cNvPr id="16" name="語音泡泡: 橢圓形 15">
+            <a:extLst>
+              <a:ext uri="{FF2B5EF4-FFF2-40B4-BE49-F238E27FC236}">
+                <a16:creationId xmlns:a16="http://schemas.microsoft.com/office/drawing/2014/main" id="{93E645E8-E0A5-4C7B-A417-7DB25BA6AC28}"/>
+              </a:ext>
+            </a:extLst>
+          </p:cNvPr>
+          <p:cNvSpPr/>
+          <p:nvPr/>
+        </p:nvSpPr>
+        <p:spPr>
+          <a:xfrm>
+            <a:off x="8895097" y="3295521"/>
+            <a:ext cx="1399591" cy="923330"/>
+          </a:xfrm>
+          <a:prstGeom prst="wedgeEllipseCallout">
+            <a:avLst>
+              <a:gd name="adj1" fmla="val -59500"/>
+              <a:gd name="adj2" fmla="val 43300"/>
+            </a:avLst>
+          </a:prstGeom>
+        </p:spPr>
+        <p:style>
+          <a:lnRef idx="1">
+            <a:schemeClr val="accent4"/>
+          </a:lnRef>
+          <a:fillRef idx="2">
+            <a:schemeClr val="accent4"/>
+          </a:fillRef>
+          <a:effectRef idx="1">
+            <a:schemeClr val="accent4"/>
+          </a:effectRef>
+          <a:fontRef idx="minor">
+            <a:schemeClr val="dk1"/>
+          </a:fontRef>
+        </p:style>
+        <p:txBody>
+          <a:bodyPr rtlCol="0" anchor="ctr"/>
+          <a:lstStyle/>
+          <a:p>
+            <a:pPr algn="ctr"/>
+            <a:r>
+              <a:rPr lang="zh-TW" altLang="en-US" sz="2800" dirty="0">
+                <a:solidFill>
+                  <a:srgbClr val="C00000"/>
+                </a:solidFill>
+                <a:latin typeface="華康中圓體" panose="020F0509000000000000" pitchFamily="49" charset="-120"/>
+                <a:ea typeface="華康中圓體" panose="020F0509000000000000" pitchFamily="49" charset="-120"/>
+              </a:rPr>
+              <a:t>及格</a:t>
+            </a:r>
+          </a:p>
+        </p:txBody>
+      </p:sp>
+    </p:spTree>
+    <p:extLst>
+      <p:ext uri="{BB962C8B-B14F-4D97-AF65-F5344CB8AC3E}">
+        <p14:creationId xmlns:p14="http://schemas.microsoft.com/office/powerpoint/2010/main" val="4274226022"/>
+      </p:ext>
+    </p:extLst>
+  </p:cSld>
+  <p:clrMapOvr>
+    <a:masterClrMapping/>
+  </p:clrMapOvr>
+</p:sld>
+</file>
+
 <file path=ppt/theme/theme1.xml><?xml version="1.0" encoding="utf-8"?>
 <a:theme xmlns:a="http://schemas.openxmlformats.org/drawingml/2006/main" name="Office 佈景主題">
   <a:themeElements>

</xml_diff>